<commit_message>
Spiral model in detail started.
</commit_message>
<xml_diff>
--- a/Modules/Software engineering (P175B015)/Video/Spiral.pptx
+++ b/Modules/Software engineering (P175B015)/Video/Spiral.pptx
@@ -10784,8 +10784,16 @@
               <a:buNone/>
             </a:pPr>
             <a:r>
+              <a:rPr lang="en-US" dirty="0"/>
+              <a:t>Spiral</a:t>
+            </a:r>
+            <a:r>
               <a:rPr lang="lt-LT" dirty="0"/>
-              <a:t>Waterfall model</a:t>
+              <a:t> model</a:t>
+            </a:r>
+            <a:r>
+              <a:rPr lang="en-US" dirty="0"/>
+              <a:t> in detail</a:t>
             </a:r>
             <a:endParaRPr dirty="0"/>
           </a:p>
@@ -10837,185 +10845,6 @@
           </a:p>
         </p:txBody>
       </p:sp>
-      <p:sp>
-        <p:nvSpPr>
-          <p:cNvPr id="23" name="L-Shape 22">
-            <a:extLst>
-              <a:ext uri="{FF2B5EF4-FFF2-40B4-BE49-F238E27FC236}">
-                <a16:creationId xmlns:a16="http://schemas.microsoft.com/office/drawing/2014/main" id="{24918A8D-99EB-4617-9472-C757708B4573}"/>
-              </a:ext>
-            </a:extLst>
-          </p:cNvPr>
-          <p:cNvSpPr/>
-          <p:nvPr/>
-        </p:nvSpPr>
-        <p:spPr>
-          <a:xfrm rot="5400000">
-            <a:off x="10530799" y="4890779"/>
-            <a:ext cx="472553" cy="963359"/>
-          </a:xfrm>
-          <a:prstGeom prst="corner">
-            <a:avLst>
-              <a:gd name="adj1" fmla="val 16120"/>
-              <a:gd name="adj2" fmla="val 16110"/>
-            </a:avLst>
-          </a:prstGeom>
-        </p:spPr>
-        <p:style>
-          <a:lnRef idx="2">
-            <a:schemeClr val="accent1">
-              <a:hueOff val="0"/>
-              <a:satOff val="0"/>
-              <a:lumOff val="0"/>
-              <a:alphaOff val="0"/>
-            </a:schemeClr>
-          </a:lnRef>
-          <a:fillRef idx="1">
-            <a:schemeClr val="accent1">
-              <a:hueOff val="0"/>
-              <a:satOff val="0"/>
-              <a:lumOff val="0"/>
-              <a:alphaOff val="0"/>
-            </a:schemeClr>
-          </a:fillRef>
-          <a:effectRef idx="0">
-            <a:schemeClr val="accent1">
-              <a:hueOff val="0"/>
-              <a:satOff val="0"/>
-              <a:lumOff val="0"/>
-              <a:alphaOff val="0"/>
-            </a:schemeClr>
-          </a:effectRef>
-          <a:fontRef idx="minor">
-            <a:schemeClr val="lt1"/>
-          </a:fontRef>
-        </p:style>
-      </p:sp>
-      <p:sp>
-        <p:nvSpPr>
-          <p:cNvPr id="24" name="Isosceles Triangle 23">
-            <a:extLst>
-              <a:ext uri="{FF2B5EF4-FFF2-40B4-BE49-F238E27FC236}">
-                <a16:creationId xmlns:a16="http://schemas.microsoft.com/office/drawing/2014/main" id="{90A470B4-555F-40C4-880B-01ACABAE06ED}"/>
-              </a:ext>
-            </a:extLst>
-          </p:cNvPr>
-          <p:cNvSpPr/>
-          <p:nvPr/>
-        </p:nvSpPr>
-        <p:spPr>
-          <a:xfrm>
-            <a:off x="10285396" y="5799723"/>
-            <a:ext cx="292527" cy="292527"/>
-          </a:xfrm>
-          <a:prstGeom prst="triangle">
-            <a:avLst>
-              <a:gd name="adj" fmla="val 100000"/>
-            </a:avLst>
-          </a:prstGeom>
-        </p:spPr>
-        <p:style>
-          <a:lnRef idx="2">
-            <a:schemeClr val="accent1">
-              <a:hueOff val="0"/>
-              <a:satOff val="0"/>
-              <a:lumOff val="0"/>
-              <a:alphaOff val="0"/>
-            </a:schemeClr>
-          </a:lnRef>
-          <a:fillRef idx="1">
-            <a:schemeClr val="accent1">
-              <a:hueOff val="0"/>
-              <a:satOff val="0"/>
-              <a:lumOff val="0"/>
-              <a:alphaOff val="0"/>
-            </a:schemeClr>
-          </a:fillRef>
-          <a:effectRef idx="0">
-            <a:schemeClr val="accent1">
-              <a:hueOff val="0"/>
-              <a:satOff val="0"/>
-              <a:lumOff val="0"/>
-              <a:alphaOff val="0"/>
-            </a:schemeClr>
-          </a:effectRef>
-          <a:fontRef idx="minor">
-            <a:schemeClr val="lt1"/>
-          </a:fontRef>
-        </p:style>
-      </p:sp>
-      <p:sp>
-        <p:nvSpPr>
-          <p:cNvPr id="13" name="TextBox 12">
-            <a:extLst>
-              <a:ext uri="{FF2B5EF4-FFF2-40B4-BE49-F238E27FC236}">
-                <a16:creationId xmlns:a16="http://schemas.microsoft.com/office/drawing/2014/main" id="{7A8DA1D0-9DDE-4BF1-B3DF-F18F704265FC}"/>
-              </a:ext>
-            </a:extLst>
-          </p:cNvPr>
-          <p:cNvSpPr txBox="1"/>
-          <p:nvPr/>
-        </p:nvSpPr>
-        <p:spPr>
-          <a:xfrm>
-            <a:off x="9392689" y="5218592"/>
-            <a:ext cx="671979" cy="307777"/>
-          </a:xfrm>
-          <a:prstGeom prst="rect">
-            <a:avLst/>
-          </a:prstGeom>
-          <a:noFill/>
-        </p:spPr>
-        <p:txBody>
-          <a:bodyPr wrap="none" rtlCol="0">
-            <a:spAutoFit/>
-          </a:bodyPr>
-          <a:lstStyle/>
-          <a:p>
-            <a:r>
-              <a:rPr lang="lt-LT" dirty="0"/>
-              <a:t>phase</a:t>
-            </a:r>
-            <a:endParaRPr lang="en-US" dirty="0"/>
-          </a:p>
-        </p:txBody>
-      </p:sp>
-      <p:sp>
-        <p:nvSpPr>
-          <p:cNvPr id="26" name="TextBox 25">
-            <a:extLst>
-              <a:ext uri="{FF2B5EF4-FFF2-40B4-BE49-F238E27FC236}">
-                <a16:creationId xmlns:a16="http://schemas.microsoft.com/office/drawing/2014/main" id="{9C06B8AB-BAFD-4A97-B2D0-42FC65D6DA04}"/>
-              </a:ext>
-            </a:extLst>
-          </p:cNvPr>
-          <p:cNvSpPr txBox="1"/>
-          <p:nvPr/>
-        </p:nvSpPr>
-        <p:spPr>
-          <a:xfrm>
-            <a:off x="8744989" y="5770737"/>
-            <a:ext cx="1338828" cy="307777"/>
-          </a:xfrm>
-          <a:prstGeom prst="rect">
-            <a:avLst/>
-          </a:prstGeom>
-          <a:noFill/>
-        </p:spPr>
-        <p:txBody>
-          <a:bodyPr wrap="none" rtlCol="0">
-            <a:spAutoFit/>
-          </a:bodyPr>
-          <a:lstStyle/>
-          <a:p>
-            <a:r>
-              <a:rPr lang="lt-LT" dirty="0"/>
-              <a:t>Work products</a:t>
-            </a:r>
-            <a:endParaRPr lang="en-US" dirty="0"/>
-          </a:p>
-        </p:txBody>
-      </p:sp>
       <p:pic>
         <p:nvPicPr>
           <p:cNvPr id="14" name="Picture 13">
@@ -11038,7 +10867,7 @@
         </p:blipFill>
         <p:spPr>
           <a:xfrm>
-            <a:off x="2493824" y="1325473"/>
+            <a:off x="2666999" y="1308382"/>
             <a:ext cx="5340899" cy="4896537"/>
           </a:xfrm>
           <a:prstGeom prst="rect">

</xml_diff>